<commit_message>
Präsi überarbeitet, pdfs erstellt
</commit_message>
<xml_diff>
--- a/Dokumente/Coaching/2016-12-14/2016-12-14 Präsentation Projektmgmt.pptx
+++ b/Dokumente/Coaching/2016-12-14/2016-12-14 Präsentation Projektmgmt.pptx
@@ -242,7 +242,7 @@
               <a:pPr>
                 <a:defRPr/>
               </a:pPr>
-              <a:t>13.12.2016</a:t>
+              <a:t>14.12.2016</a:t>
             </a:fld>
             <a:endParaRPr lang="de-DE"/>
           </a:p>
@@ -326,7 +326,7 @@
     </p:spTree>
     <p:extLst>
       <p:ext uri="{BB962C8B-B14F-4D97-AF65-F5344CB8AC3E}">
-        <p14:creationId xmlns:p14="http://schemas.microsoft.com/office/powerpoint/2010/main" xmlns="" val="2667667891"/>
+        <p14:creationId xmlns="" xmlns:p14="http://schemas.microsoft.com/office/powerpoint/2010/main" val="2667667891"/>
       </p:ext>
     </p:extLst>
   </p:cSld>
@@ -425,7 +425,7 @@
               <a:pPr>
                 <a:defRPr/>
               </a:pPr>
-              <a:t>13.12.2016</a:t>
+              <a:t>14.12.2016</a:t>
             </a:fld>
             <a:endParaRPr lang="de-DE"/>
           </a:p>
@@ -604,7 +604,7 @@
     </p:spTree>
     <p:extLst>
       <p:ext uri="{BB962C8B-B14F-4D97-AF65-F5344CB8AC3E}">
-        <p14:creationId xmlns:p14="http://schemas.microsoft.com/office/powerpoint/2010/main" xmlns="" val="2795533648"/>
+        <p14:creationId xmlns="" xmlns:p14="http://schemas.microsoft.com/office/powerpoint/2010/main" val="2795533648"/>
       </p:ext>
     </p:extLst>
   </p:cSld>
@@ -777,7 +777,7 @@
           </a:ln>
           <a:extLst>
             <a:ext uri="{909E8E84-426E-40DD-AFC4-6F175D3DCCD1}">
-              <a14:hiddenFill xmlns:a14="http://schemas.microsoft.com/office/drawing/2010/main" xmlns="">
+              <a14:hiddenFill xmlns="" xmlns:a14="http://schemas.microsoft.com/office/drawing/2010/main">
                 <a:solidFill>
                   <a:srgbClr val="FFFFFF"/>
                 </a:solidFill>
@@ -800,14 +800,14 @@
           <a:noFill/>
           <a:extLst>
             <a:ext uri="{909E8E84-426E-40DD-AFC4-6F175D3DCCD1}">
-              <a14:hiddenFill xmlns:a14="http://schemas.microsoft.com/office/drawing/2010/main" xmlns="">
+              <a14:hiddenFill xmlns="" xmlns:a14="http://schemas.microsoft.com/office/drawing/2010/main">
                 <a:solidFill>
                   <a:srgbClr val="FFFFFF"/>
                 </a:solidFill>
               </a14:hiddenFill>
             </a:ext>
             <a:ext uri="{91240B29-F687-4F45-9708-019B960494DF}">
-              <a14:hiddenLine xmlns:a14="http://schemas.microsoft.com/office/drawing/2010/main" xmlns="" w="9525">
+              <a14:hiddenLine xmlns="" xmlns:a14="http://schemas.microsoft.com/office/drawing/2010/main" w="9525">
                 <a:solidFill>
                   <a:srgbClr val="000000"/>
                 </a:solidFill>
@@ -844,14 +844,14 @@
           <a:noFill/>
           <a:extLst>
             <a:ext uri="{909E8E84-426E-40DD-AFC4-6F175D3DCCD1}">
-              <a14:hiddenFill xmlns:a14="http://schemas.microsoft.com/office/drawing/2010/main" xmlns="">
+              <a14:hiddenFill xmlns="" xmlns:a14="http://schemas.microsoft.com/office/drawing/2010/main">
                 <a:solidFill>
                   <a:srgbClr val="FFFFFF"/>
                 </a:solidFill>
               </a14:hiddenFill>
             </a:ext>
             <a:ext uri="{91240B29-F687-4F45-9708-019B960494DF}">
-              <a14:hiddenLine xmlns:a14="http://schemas.microsoft.com/office/drawing/2010/main" xmlns="" w="9525">
+              <a14:hiddenLine xmlns="" xmlns:a14="http://schemas.microsoft.com/office/drawing/2010/main" w="9525">
                 <a:solidFill>
                   <a:srgbClr val="000000"/>
                 </a:solidFill>
@@ -1028,7 +1028,7 @@
           </a:ln>
           <a:extLst>
             <a:ext uri="{909E8E84-426E-40DD-AFC4-6F175D3DCCD1}">
-              <a14:hiddenFill xmlns:a14="http://schemas.microsoft.com/office/drawing/2010/main" xmlns="">
+              <a14:hiddenFill xmlns="" xmlns:a14="http://schemas.microsoft.com/office/drawing/2010/main">
                 <a:solidFill>
                   <a:srgbClr val="FFFFFF"/>
                 </a:solidFill>
@@ -1051,14 +1051,14 @@
           <a:noFill/>
           <a:extLst>
             <a:ext uri="{909E8E84-426E-40DD-AFC4-6F175D3DCCD1}">
-              <a14:hiddenFill xmlns:a14="http://schemas.microsoft.com/office/drawing/2010/main" xmlns="">
+              <a14:hiddenFill xmlns="" xmlns:a14="http://schemas.microsoft.com/office/drawing/2010/main">
                 <a:solidFill>
                   <a:srgbClr val="FFFFFF"/>
                 </a:solidFill>
               </a14:hiddenFill>
             </a:ext>
             <a:ext uri="{91240B29-F687-4F45-9708-019B960494DF}">
-              <a14:hiddenLine xmlns:a14="http://schemas.microsoft.com/office/drawing/2010/main" xmlns="" w="9525">
+              <a14:hiddenLine xmlns="" xmlns:a14="http://schemas.microsoft.com/office/drawing/2010/main" w="9525">
                 <a:solidFill>
                   <a:srgbClr val="000000"/>
                 </a:solidFill>
@@ -1095,14 +1095,14 @@
           <a:noFill/>
           <a:extLst>
             <a:ext uri="{909E8E84-426E-40DD-AFC4-6F175D3DCCD1}">
-              <a14:hiddenFill xmlns:a14="http://schemas.microsoft.com/office/drawing/2010/main" xmlns="">
+              <a14:hiddenFill xmlns="" xmlns:a14="http://schemas.microsoft.com/office/drawing/2010/main">
                 <a:solidFill>
                   <a:srgbClr val="FFFFFF"/>
                 </a:solidFill>
               </a14:hiddenFill>
             </a:ext>
             <a:ext uri="{91240B29-F687-4F45-9708-019B960494DF}">
-              <a14:hiddenLine xmlns:a14="http://schemas.microsoft.com/office/drawing/2010/main" xmlns="" w="9525">
+              <a14:hiddenLine xmlns="" xmlns:a14="http://schemas.microsoft.com/office/drawing/2010/main" w="9525">
                 <a:solidFill>
                   <a:srgbClr val="000000"/>
                 </a:solidFill>
@@ -1335,7 +1335,7 @@
           <a:blip r:embed="rId2">
             <a:extLst>
               <a:ext uri="{28A0092B-C50C-407E-A947-70E740481C1C}">
-                <a14:useLocalDpi xmlns:a14="http://schemas.microsoft.com/office/drawing/2010/main" xmlns="" val="0"/>
+                <a14:useLocalDpi xmlns="" xmlns:a14="http://schemas.microsoft.com/office/drawing/2010/main" val="0"/>
               </a:ext>
             </a:extLst>
           </a:blip>
@@ -1358,14 +1358,14 @@
           </a:ln>
           <a:extLst>
             <a:ext uri="{909E8E84-426E-40DD-AFC4-6F175D3DCCD1}">
-              <a14:hiddenFill xmlns:a14="http://schemas.microsoft.com/office/drawing/2010/main" xmlns="">
+              <a14:hiddenFill xmlns="" xmlns:a14="http://schemas.microsoft.com/office/drawing/2010/main">
                 <a:solidFill>
                   <a:srgbClr val="FFFFFF"/>
                 </a:solidFill>
               </a14:hiddenFill>
             </a:ext>
             <a:ext uri="{91240B29-F687-4F45-9708-019B960494DF}">
-              <a14:hiddenLine xmlns:a14="http://schemas.microsoft.com/office/drawing/2010/main" xmlns="" w="9525">
+              <a14:hiddenLine xmlns="" xmlns:a14="http://schemas.microsoft.com/office/drawing/2010/main" w="9525">
                 <a:solidFill>
                   <a:srgbClr val="000000"/>
                 </a:solidFill>
@@ -1597,7 +1597,7 @@
     </p:spTree>
     <p:extLst>
       <p:ext uri="{BB962C8B-B14F-4D97-AF65-F5344CB8AC3E}">
-        <p14:creationId xmlns:p14="http://schemas.microsoft.com/office/powerpoint/2010/main" xmlns="" val="161433667"/>
+        <p14:creationId xmlns="" xmlns:p14="http://schemas.microsoft.com/office/powerpoint/2010/main" val="161433667"/>
       </p:ext>
     </p:extLst>
   </p:cSld>
@@ -1744,7 +1744,7 @@
                 </a:tabLst>
                 <a:defRPr/>
               </a:pPr>
-              <a:t>13. Dezember 2016</a:t>
+              <a:t>14. Dezember 2016</a:t>
             </a:fld>
             <a:r>
               <a:rPr lang="de-DE" sz="800" dirty="0">
@@ -1782,7 +1782,7 @@
           <a:blip r:embed="rId2">
             <a:extLst>
               <a:ext uri="{28A0092B-C50C-407E-A947-70E740481C1C}">
-                <a14:useLocalDpi xmlns:a14="http://schemas.microsoft.com/office/drawing/2010/main" xmlns="" val="0"/>
+                <a14:useLocalDpi xmlns="" xmlns:a14="http://schemas.microsoft.com/office/drawing/2010/main" val="0"/>
               </a:ext>
             </a:extLst>
           </a:blip>
@@ -1805,14 +1805,14 @@
           </a:ln>
           <a:extLst>
             <a:ext uri="{909E8E84-426E-40DD-AFC4-6F175D3DCCD1}">
-              <a14:hiddenFill xmlns:a14="http://schemas.microsoft.com/office/drawing/2010/main" xmlns="">
+              <a14:hiddenFill xmlns="" xmlns:a14="http://schemas.microsoft.com/office/drawing/2010/main">
                 <a:solidFill>
                   <a:srgbClr val="FFFFFF"/>
                 </a:solidFill>
               </a14:hiddenFill>
             </a:ext>
             <a:ext uri="{91240B29-F687-4F45-9708-019B960494DF}">
-              <a14:hiddenLine xmlns:a14="http://schemas.microsoft.com/office/drawing/2010/main" xmlns="" w="9525">
+              <a14:hiddenLine xmlns="" xmlns:a14="http://schemas.microsoft.com/office/drawing/2010/main" w="9525">
                 <a:solidFill>
                   <a:srgbClr val="000000"/>
                 </a:solidFill>
@@ -1954,7 +1954,7 @@
     </p:spTree>
     <p:extLst>
       <p:ext uri="{BB962C8B-B14F-4D97-AF65-F5344CB8AC3E}">
-        <p14:creationId xmlns:p14="http://schemas.microsoft.com/office/powerpoint/2010/main" xmlns="" val="3865959554"/>
+        <p14:creationId xmlns="" xmlns:p14="http://schemas.microsoft.com/office/powerpoint/2010/main" val="3865959554"/>
       </p:ext>
     </p:extLst>
   </p:cSld>
@@ -2101,7 +2101,7 @@
                 </a:tabLst>
                 <a:defRPr/>
               </a:pPr>
-              <a:t>13. Dezember 2016</a:t>
+              <a:t>14. Dezember 2016</a:t>
             </a:fld>
             <a:r>
               <a:rPr lang="de-DE" sz="800" dirty="0">
@@ -2139,7 +2139,7 @@
           <a:blip r:embed="rId2">
             <a:extLst>
               <a:ext uri="{28A0092B-C50C-407E-A947-70E740481C1C}">
-                <a14:useLocalDpi xmlns:a14="http://schemas.microsoft.com/office/drawing/2010/main" xmlns="" val="0"/>
+                <a14:useLocalDpi xmlns="" xmlns:a14="http://schemas.microsoft.com/office/drawing/2010/main" val="0"/>
               </a:ext>
             </a:extLst>
           </a:blip>
@@ -2162,14 +2162,14 @@
           </a:ln>
           <a:extLst>
             <a:ext uri="{909E8E84-426E-40DD-AFC4-6F175D3DCCD1}">
-              <a14:hiddenFill xmlns:a14="http://schemas.microsoft.com/office/drawing/2010/main" xmlns="">
+              <a14:hiddenFill xmlns="" xmlns:a14="http://schemas.microsoft.com/office/drawing/2010/main">
                 <a:solidFill>
                   <a:srgbClr val="FFFFFF"/>
                 </a:solidFill>
               </a14:hiddenFill>
             </a:ext>
             <a:ext uri="{91240B29-F687-4F45-9708-019B960494DF}">
-              <a14:hiddenLine xmlns:a14="http://schemas.microsoft.com/office/drawing/2010/main" xmlns="" w="9525">
+              <a14:hiddenLine xmlns="" xmlns:a14="http://schemas.microsoft.com/office/drawing/2010/main" w="9525">
                 <a:solidFill>
                   <a:srgbClr val="000000"/>
                 </a:solidFill>
@@ -2340,7 +2340,7 @@
     </p:spTree>
     <p:extLst>
       <p:ext uri="{BB962C8B-B14F-4D97-AF65-F5344CB8AC3E}">
-        <p14:creationId xmlns:p14="http://schemas.microsoft.com/office/powerpoint/2010/main" xmlns="" val="3404298785"/>
+        <p14:creationId xmlns="" xmlns:p14="http://schemas.microsoft.com/office/powerpoint/2010/main" val="3404298785"/>
       </p:ext>
     </p:extLst>
   </p:cSld>
@@ -2487,7 +2487,7 @@
                 </a:tabLst>
                 <a:defRPr/>
               </a:pPr>
-              <a:t>13. Dezember 2016</a:t>
+              <a:t>14. Dezember 2016</a:t>
             </a:fld>
             <a:r>
               <a:rPr lang="de-DE" sz="800" dirty="0">
@@ -2525,7 +2525,7 @@
           <a:blip r:embed="rId2">
             <a:extLst>
               <a:ext uri="{28A0092B-C50C-407E-A947-70E740481C1C}">
-                <a14:useLocalDpi xmlns:a14="http://schemas.microsoft.com/office/drawing/2010/main" xmlns="" val="0"/>
+                <a14:useLocalDpi xmlns="" xmlns:a14="http://schemas.microsoft.com/office/drawing/2010/main" val="0"/>
               </a:ext>
             </a:extLst>
           </a:blip>
@@ -2548,14 +2548,14 @@
           </a:ln>
           <a:extLst>
             <a:ext uri="{909E8E84-426E-40DD-AFC4-6F175D3DCCD1}">
-              <a14:hiddenFill xmlns:a14="http://schemas.microsoft.com/office/drawing/2010/main" xmlns="">
+              <a14:hiddenFill xmlns="" xmlns:a14="http://schemas.microsoft.com/office/drawing/2010/main">
                 <a:solidFill>
                   <a:srgbClr val="FFFFFF"/>
                 </a:solidFill>
               </a14:hiddenFill>
             </a:ext>
             <a:ext uri="{91240B29-F687-4F45-9708-019B960494DF}">
-              <a14:hiddenLine xmlns:a14="http://schemas.microsoft.com/office/drawing/2010/main" xmlns="" w="9525">
+              <a14:hiddenLine xmlns="" xmlns:a14="http://schemas.microsoft.com/office/drawing/2010/main" w="9525">
                 <a:solidFill>
                   <a:srgbClr val="000000"/>
                 </a:solidFill>
@@ -2783,7 +2783,7 @@
     </p:spTree>
     <p:extLst>
       <p:ext uri="{BB962C8B-B14F-4D97-AF65-F5344CB8AC3E}">
-        <p14:creationId xmlns:p14="http://schemas.microsoft.com/office/powerpoint/2010/main" xmlns="" val="3982439678"/>
+        <p14:creationId xmlns="" xmlns:p14="http://schemas.microsoft.com/office/powerpoint/2010/main" val="3982439678"/>
       </p:ext>
     </p:extLst>
   </p:cSld>
@@ -2892,7 +2892,7 @@
           <a:blip r:embed="rId2">
             <a:extLst>
               <a:ext uri="{28A0092B-C50C-407E-A947-70E740481C1C}">
-                <a14:useLocalDpi xmlns:a14="http://schemas.microsoft.com/office/drawing/2010/main" xmlns="" val="0"/>
+                <a14:useLocalDpi xmlns="" xmlns:a14="http://schemas.microsoft.com/office/drawing/2010/main" val="0"/>
               </a:ext>
             </a:extLst>
           </a:blip>
@@ -2915,14 +2915,14 @@
           </a:ln>
           <a:extLst>
             <a:ext uri="{909E8E84-426E-40DD-AFC4-6F175D3DCCD1}">
-              <a14:hiddenFill xmlns:a14="http://schemas.microsoft.com/office/drawing/2010/main" xmlns="">
+              <a14:hiddenFill xmlns="" xmlns:a14="http://schemas.microsoft.com/office/drawing/2010/main">
                 <a:solidFill>
                   <a:srgbClr val="FFFFFF"/>
                 </a:solidFill>
               </a14:hiddenFill>
             </a:ext>
             <a:ext uri="{91240B29-F687-4F45-9708-019B960494DF}">
-              <a14:hiddenLine xmlns:a14="http://schemas.microsoft.com/office/drawing/2010/main" xmlns="" w="9525">
+              <a14:hiddenLine xmlns="" xmlns:a14="http://schemas.microsoft.com/office/drawing/2010/main" w="9525">
                 <a:solidFill>
                   <a:srgbClr val="000000"/>
                 </a:solidFill>
@@ -3036,7 +3036,7 @@
     </p:spTree>
     <p:extLst>
       <p:ext uri="{BB962C8B-B14F-4D97-AF65-F5344CB8AC3E}">
-        <p14:creationId xmlns:p14="http://schemas.microsoft.com/office/powerpoint/2010/main" xmlns="" val="3524090375"/>
+        <p14:creationId xmlns="" xmlns:p14="http://schemas.microsoft.com/office/powerpoint/2010/main" val="3524090375"/>
       </p:ext>
     </p:extLst>
   </p:cSld>
@@ -3095,14 +3095,14 @@
           </a:ln>
           <a:extLst>
             <a:ext uri="{909E8E84-426E-40DD-AFC4-6F175D3DCCD1}">
-              <a14:hiddenFill xmlns:a14="http://schemas.microsoft.com/office/drawing/2010/main" xmlns="">
+              <a14:hiddenFill xmlns="" xmlns:a14="http://schemas.microsoft.com/office/drawing/2010/main">
                 <a:solidFill>
                   <a:srgbClr val="FFFFFF"/>
                 </a:solidFill>
               </a14:hiddenFill>
             </a:ext>
             <a:ext uri="{91240B29-F687-4F45-9708-019B960494DF}">
-              <a14:hiddenLine xmlns:a14="http://schemas.microsoft.com/office/drawing/2010/main" xmlns="" w="9525">
+              <a14:hiddenLine xmlns="" xmlns:a14="http://schemas.microsoft.com/office/drawing/2010/main" w="9525">
                 <a:solidFill>
                   <a:srgbClr val="000000"/>
                 </a:solidFill>
@@ -3153,14 +3153,14 @@
           </a:ln>
           <a:extLst>
             <a:ext uri="{909E8E84-426E-40DD-AFC4-6F175D3DCCD1}">
-              <a14:hiddenFill xmlns:a14="http://schemas.microsoft.com/office/drawing/2010/main" xmlns="">
+              <a14:hiddenFill xmlns="" xmlns:a14="http://schemas.microsoft.com/office/drawing/2010/main">
                 <a:solidFill>
                   <a:srgbClr val="FFFFFF"/>
                 </a:solidFill>
               </a14:hiddenFill>
             </a:ext>
             <a:ext uri="{91240B29-F687-4F45-9708-019B960494DF}">
-              <a14:hiddenLine xmlns:a14="http://schemas.microsoft.com/office/drawing/2010/main" xmlns="" w="9525">
+              <a14:hiddenLine xmlns="" xmlns:a14="http://schemas.microsoft.com/office/drawing/2010/main" w="9525">
                 <a:solidFill>
                   <a:srgbClr val="000000"/>
                 </a:solidFill>
@@ -3261,7 +3261,7 @@
               <a:pPr>
                 <a:defRPr/>
               </a:pPr>
-              <a:t>13. Dezember 2016</a:t>
+              <a:t>14. Dezember 2016</a:t>
             </a:fld>
             <a:endParaRPr lang="de-DE" dirty="0"/>
           </a:p>
@@ -3820,23 +3820,7 @@
                   <a:srgbClr val="00B1AC"/>
                 </a:solidFill>
               </a:rPr>
-              <a:t>Projektstatus </a:t>
-            </a:r>
-            <a:r>
-              <a:rPr lang="de-DE" dirty="0" smtClean="0">
-                <a:solidFill>
-                  <a:srgbClr val="00B1AC"/>
-                </a:solidFill>
-              </a:rPr>
-              <a:t>14.12.2016</a:t>
-            </a:r>
-            <a:r>
-              <a:rPr lang="de-DE" dirty="0" smtClean="0">
-                <a:solidFill>
-                  <a:srgbClr val="00B1AC"/>
-                </a:solidFill>
-              </a:rPr>
-              <a:t/>
+              <a:t>Projektstatus 14.12.2016</a:t>
             </a:r>
             <a:br>
               <a:rPr lang="de-DE" dirty="0" smtClean="0">
@@ -3971,7 +3955,7 @@
     </p:spTree>
     <p:extLst>
       <p:ext uri="{BB962C8B-B14F-4D97-AF65-F5344CB8AC3E}">
-        <p14:creationId xmlns:p14="http://schemas.microsoft.com/office/powerpoint/2010/main" xmlns="" val="3083275860"/>
+        <p14:creationId xmlns="" xmlns:p14="http://schemas.microsoft.com/office/powerpoint/2010/main" val="3083275860"/>
       </p:ext>
     </p:extLst>
   </p:cSld>
@@ -4301,11 +4285,7 @@
             <a:pPr marL="0" indent="0"/>
             <a:r>
               <a:rPr lang="de-DE" altLang="de-DE" dirty="0" smtClean="0"/>
-              <a:t>Statuswechsel: Grün -&gt; </a:t>
-            </a:r>
-            <a:r>
-              <a:rPr lang="de-DE" altLang="de-DE" dirty="0" smtClean="0"/>
-              <a:t>Gelb</a:t>
+              <a:t>Statuswechsel: Grün -&gt; Gelb</a:t>
             </a:r>
           </a:p>
           <a:p>
@@ -4322,13 +4302,8 @@
             </a:pPr>
             <a:r>
               <a:rPr lang="de-DE" altLang="de-DE" dirty="0" smtClean="0"/>
-              <a:t> </a:t>
-            </a:r>
-            <a:r>
-              <a:rPr lang="de-DE" altLang="de-DE" dirty="0" smtClean="0"/>
-              <a:t>Bei Implementierung leicht in Verzug</a:t>
-            </a:r>
-            <a:endParaRPr lang="de-DE" altLang="de-DE" dirty="0" smtClean="0"/>
+              <a:t> Bei Implementierung leicht in Verzug</a:t>
+            </a:r>
           </a:p>
         </p:txBody>
       </p:sp>
@@ -4395,7 +4370,6 @@
               <a:rPr lang="de-DE" altLang="de-DE" dirty="0" smtClean="0"/>
               <a:t>Projektplan ausgeklappt</a:t>
             </a:r>
-            <a:endParaRPr lang="de-DE" altLang="de-DE" dirty="0" smtClean="0"/>
           </a:p>
         </p:txBody>
       </p:sp>
@@ -4520,14 +4494,14 @@
           </a:ln>
           <a:extLst>
             <a:ext uri="{909E8E84-426E-40DD-AFC4-6F175D3DCCD1}">
-              <a14:hiddenFill xmlns:a14="http://schemas.microsoft.com/office/drawing/2010/main" xmlns="">
+              <a14:hiddenFill xmlns="" xmlns:a14="http://schemas.microsoft.com/office/drawing/2010/main">
                 <a:solidFill>
                   <a:srgbClr val="FFFFFF"/>
                 </a:solidFill>
               </a14:hiddenFill>
             </a:ext>
             <a:ext uri="{91240B29-F687-4F45-9708-019B960494DF}">
-              <a14:hiddenLine xmlns:a14="http://schemas.microsoft.com/office/drawing/2010/main" xmlns="" w="9525">
+              <a14:hiddenLine xmlns="" xmlns:a14="http://schemas.microsoft.com/office/drawing/2010/main" w="9525">
                 <a:solidFill>
                   <a:srgbClr val="000000"/>
                 </a:solidFill>
@@ -4701,14 +4675,14 @@
           </a:ln>
           <a:extLst>
             <a:ext uri="{909E8E84-426E-40DD-AFC4-6F175D3DCCD1}">
-              <a14:hiddenFill xmlns:a14="http://schemas.microsoft.com/office/drawing/2010/main" xmlns="">
+              <a14:hiddenFill xmlns="" xmlns:a14="http://schemas.microsoft.com/office/drawing/2010/main">
                 <a:solidFill>
                   <a:srgbClr val="FFFFFF"/>
                 </a:solidFill>
               </a14:hiddenFill>
             </a:ext>
             <a:ext uri="{91240B29-F687-4F45-9708-019B960494DF}">
-              <a14:hiddenLine xmlns:a14="http://schemas.microsoft.com/office/drawing/2010/main" xmlns="" w="9525">
+              <a14:hiddenLine xmlns="" xmlns:a14="http://schemas.microsoft.com/office/drawing/2010/main" w="9525">
                 <a:solidFill>
                   <a:srgbClr val="000000"/>
                 </a:solidFill>
@@ -4871,7 +4845,6 @@
               <a:rPr lang="de-DE" altLang="de-DE" dirty="0" smtClean="0"/>
               <a:t>Erweiterten Prototypen an Kunden geschickt</a:t>
             </a:r>
-            <a:endParaRPr lang="de-DE" altLang="de-DE" dirty="0" smtClean="0"/>
           </a:p>
         </p:txBody>
       </p:sp>
@@ -4986,7 +4959,6 @@
               <a:rPr lang="de-DE" altLang="de-DE" dirty="0" smtClean="0"/>
               <a:t>Mit Schnittstellenimplementierung beginnen</a:t>
             </a:r>
-            <a:endParaRPr lang="de-DE" altLang="de-DE" dirty="0" smtClean="0"/>
           </a:p>
         </p:txBody>
       </p:sp>
@@ -5139,14 +5111,14 @@
           <a:noFill/>
           <a:extLst>
             <a:ext uri="{909E8E84-426E-40DD-AFC4-6F175D3DCCD1}">
-              <a14:hiddenFill xmlns:a14="http://schemas.microsoft.com/office/drawing/2010/main" xmlns="">
+              <a14:hiddenFill xmlns="" xmlns:a14="http://schemas.microsoft.com/office/drawing/2010/main">
                 <a:solidFill>
                   <a:srgbClr val="FFFFFF"/>
                 </a:solidFill>
               </a14:hiddenFill>
             </a:ext>
             <a:ext uri="{91240B29-F687-4F45-9708-019B960494DF}">
-              <a14:hiddenLine xmlns:a14="http://schemas.microsoft.com/office/drawing/2010/main" xmlns="" w="9525">
+              <a14:hiddenLine xmlns="" xmlns:a14="http://schemas.microsoft.com/office/drawing/2010/main" w="9525">
                 <a:solidFill>
                   <a:srgbClr val="000000"/>
                 </a:solidFill>

</xml_diff>